<commit_message>
add etc sim demo
</commit_message>
<xml_diff>
--- a/lib/REU Final Report.pptx
+++ b/lib/REU Final Report.pptx
@@ -5,18 +5,19 @@
     <p:sldMasterId id="2147483685" r:id="rId1"/>
   </p:sldMasterIdLst>
   <p:notesMasterIdLst>
-    <p:notesMasterId r:id="rId6"/>
+    <p:notesMasterId r:id="rId7"/>
   </p:notesMasterIdLst>
   <p:sldIdLst>
     <p:sldId id="283" r:id="rId2"/>
     <p:sldId id="272" r:id="rId3"/>
-    <p:sldId id="285" r:id="rId4"/>
-    <p:sldId id="286" r:id="rId5"/>
+    <p:sldId id="287" r:id="rId4"/>
+    <p:sldId id="285" r:id="rId5"/>
+    <p:sldId id="286" r:id="rId6"/>
   </p:sldIdLst>
   <p:sldSz cx="12192000" cy="6858000"/>
   <p:notesSz cx="6858000" cy="9144000"/>
   <p:custDataLst>
-    <p:tags r:id="rId7"/>
+    <p:tags r:id="rId8"/>
   </p:custDataLst>
   <p:defaultTextStyle>
     <a:defPPr>
@@ -214,7 +215,7 @@
           <a:p>
             <a:fld id="{687775C7-74D8-4EB9-9F6A-1882D547BAD7}" type="datetimeFigureOut">
               <a:rPr lang="zh-CN" altLang="en-US" smtClean="0"/>
-              <a:t>2023/6/8</a:t>
+              <a:t>2023/6/13</a:t>
             </a:fld>
             <a:endParaRPr lang="zh-CN" altLang="en-US"/>
           </a:p>
@@ -733,7 +734,7 @@
     </p:spTree>
     <p:extLst>
       <p:ext uri="{BB962C8B-B14F-4D97-AF65-F5344CB8AC3E}">
-        <p14:creationId xmlns:p14="http://schemas.microsoft.com/office/powerpoint/2010/main" val="4030648647"/>
+        <p14:creationId xmlns:p14="http://schemas.microsoft.com/office/powerpoint/2010/main" val="3618613513"/>
       </p:ext>
     </p:extLst>
   </p:cSld>
@@ -814,6 +815,95 @@
             <a:fld id="{4F2C472D-E06A-4DEE-A03D-A77B88F9E2DF}" type="slidenum">
               <a:rPr lang="zh-CN" altLang="en-US" smtClean="0"/>
               <a:t>4</a:t>
+            </a:fld>
+            <a:endParaRPr lang="zh-CN" altLang="en-US"/>
+          </a:p>
+        </p:txBody>
+      </p:sp>
+    </p:spTree>
+    <p:extLst>
+      <p:ext uri="{BB962C8B-B14F-4D97-AF65-F5344CB8AC3E}">
+        <p14:creationId xmlns:p14="http://schemas.microsoft.com/office/powerpoint/2010/main" val="4030648647"/>
+      </p:ext>
+    </p:extLst>
+  </p:cSld>
+  <p:clrMapOvr>
+    <a:masterClrMapping/>
+  </p:clrMapOvr>
+</p:notes>
+</file>
+
+<file path=ppt/notesSlides/notesSlide5.xml><?xml version="1.0" encoding="utf-8"?>
+<p:notes xmlns:a="http://schemas.openxmlformats.org/drawingml/2006/main" xmlns:r="http://schemas.openxmlformats.org/officeDocument/2006/relationships" xmlns:p="http://schemas.openxmlformats.org/presentationml/2006/main">
+  <p:cSld>
+    <p:spTree>
+      <p:nvGrpSpPr>
+        <p:cNvPr id="1" name=""/>
+        <p:cNvGrpSpPr/>
+        <p:nvPr/>
+      </p:nvGrpSpPr>
+      <p:grpSpPr>
+        <a:xfrm>
+          <a:off x="0" y="0"/>
+          <a:ext cx="0" cy="0"/>
+          <a:chOff x="0" y="0"/>
+          <a:chExt cx="0" cy="0"/>
+        </a:xfrm>
+      </p:grpSpPr>
+      <p:sp>
+        <p:nvSpPr>
+          <p:cNvPr id="2" name="幻灯片图像占位符 1"/>
+          <p:cNvSpPr>
+            <a:spLocks noGrp="1" noRot="1" noChangeAspect="1"/>
+          </p:cNvSpPr>
+          <p:nvPr>
+            <p:ph type="sldImg"/>
+          </p:nvPr>
+        </p:nvSpPr>
+        <p:spPr>
+          <a:xfrm>
+            <a:off x="381000" y="685800"/>
+            <a:ext cx="6096000" cy="3429000"/>
+          </a:xfrm>
+        </p:spPr>
+      </p:sp>
+      <p:sp>
+        <p:nvSpPr>
+          <p:cNvPr id="3" name="备注占位符 2"/>
+          <p:cNvSpPr>
+            <a:spLocks noGrp="1"/>
+          </p:cNvSpPr>
+          <p:nvPr>
+            <p:ph type="body" idx="1"/>
+          </p:nvPr>
+        </p:nvSpPr>
+        <p:spPr/>
+        <p:txBody>
+          <a:bodyPr/>
+          <a:lstStyle/>
+          <a:p>
+            <a:endParaRPr lang="zh-CN" altLang="en-US"/>
+          </a:p>
+        </p:txBody>
+      </p:sp>
+      <p:sp>
+        <p:nvSpPr>
+          <p:cNvPr id="4" name="灯片编号占位符 3"/>
+          <p:cNvSpPr>
+            <a:spLocks noGrp="1"/>
+          </p:cNvSpPr>
+          <p:nvPr>
+            <p:ph type="sldNum" sz="quarter" idx="10"/>
+          </p:nvPr>
+        </p:nvSpPr>
+        <p:spPr/>
+        <p:txBody>
+          <a:bodyPr/>
+          <a:lstStyle/>
+          <a:p>
+            <a:fld id="{4F2C472D-E06A-4DEE-A03D-A77B88F9E2DF}" type="slidenum">
+              <a:rPr lang="zh-CN" altLang="en-US" smtClean="0"/>
+              <a:t>5</a:t>
             </a:fld>
             <a:endParaRPr lang="zh-CN" altLang="en-US"/>
           </a:p>
@@ -1394,7 +1484,7 @@
           <a:p>
             <a:fld id="{3750C571-70CC-4003-99D2-3E1FD9E8B1B8}" type="datetimeFigureOut">
               <a:rPr lang="en-US" smtClean="0"/>
-              <a:t>6/8/2023</a:t>
+              <a:t>6/13/2023</a:t>
             </a:fld>
             <a:endParaRPr lang="en-US"/>
           </a:p>
@@ -1501,7 +1591,7 @@
           <a:p>
             <a:fld id="{D67E1CCE-4C69-481E-8A82-8C3A41A945F4}" type="datetimeFigureOut">
               <a:rPr lang="zh-CN" altLang="en-US" smtClean="0"/>
-              <a:t>2023/6/8</a:t>
+              <a:t>2023/6/13</a:t>
             </a:fld>
             <a:endParaRPr lang="zh-CN" altLang="en-US"/>
           </a:p>
@@ -12240,6 +12330,610 @@
                   <a:cs typeface="Times New Roman" panose="02020603050405020304" pitchFamily="18" charset="0"/>
                   <a:sym typeface="+mn-lt"/>
                 </a:rPr>
+                <a:t>Formation Control</a:t>
+              </a:r>
+            </a:p>
+          </p:txBody>
+        </p:sp>
+        <p:grpSp>
+          <p:nvGrpSpPr>
+            <p:cNvPr id="4" name="Group 3">
+              <a:extLst>
+                <a:ext uri="{FF2B5EF4-FFF2-40B4-BE49-F238E27FC236}">
+                  <a16:creationId xmlns:a16="http://schemas.microsoft.com/office/drawing/2014/main" id="{BB6E91F3-D0E8-78B6-C956-022924EF77C3}"/>
+                </a:ext>
+              </a:extLst>
+            </p:cNvPr>
+            <p:cNvGrpSpPr/>
+            <p:nvPr/>
+          </p:nvGrpSpPr>
+          <p:grpSpPr>
+            <a:xfrm>
+              <a:off x="387262" y="391902"/>
+              <a:ext cx="489626" cy="562546"/>
+              <a:chOff x="387262" y="391902"/>
+              <a:chExt cx="489626" cy="562546"/>
+            </a:xfrm>
+          </p:grpSpPr>
+          <p:sp>
+            <p:nvSpPr>
+              <p:cNvPr id="49" name="Freeform 15">
+                <a:extLst>
+                  <a:ext uri="{FF2B5EF4-FFF2-40B4-BE49-F238E27FC236}">
+                    <a16:creationId xmlns:a16="http://schemas.microsoft.com/office/drawing/2014/main" id="{50CFBC5C-C61D-4A67-AC9E-9295E93D3309}"/>
+                  </a:ext>
+                </a:extLst>
+              </p:cNvPr>
+              <p:cNvSpPr>
+                <a:spLocks/>
+              </p:cNvSpPr>
+              <p:nvPr/>
+            </p:nvSpPr>
+            <p:spPr bwMode="auto">
+              <a:xfrm>
+                <a:off x="389654" y="391902"/>
+                <a:ext cx="487234" cy="562546"/>
+              </a:xfrm>
+              <a:custGeom>
+                <a:avLst/>
+                <a:gdLst>
+                  <a:gd name="T0" fmla="*/ 0 w 1171"/>
+                  <a:gd name="T1" fmla="*/ 1014 h 1352"/>
+                  <a:gd name="T2" fmla="*/ 0 w 1171"/>
+                  <a:gd name="T3" fmla="*/ 338 h 1352"/>
+                  <a:gd name="T4" fmla="*/ 586 w 1171"/>
+                  <a:gd name="T5" fmla="*/ 0 h 1352"/>
+                  <a:gd name="T6" fmla="*/ 1171 w 1171"/>
+                  <a:gd name="T7" fmla="*/ 338 h 1352"/>
+                  <a:gd name="T8" fmla="*/ 1171 w 1171"/>
+                  <a:gd name="T9" fmla="*/ 1014 h 1352"/>
+                  <a:gd name="T10" fmla="*/ 586 w 1171"/>
+                  <a:gd name="T11" fmla="*/ 1352 h 1352"/>
+                  <a:gd name="T12" fmla="*/ 0 w 1171"/>
+                  <a:gd name="T13" fmla="*/ 1014 h 1352"/>
+                </a:gdLst>
+                <a:ahLst/>
+                <a:cxnLst>
+                  <a:cxn ang="0">
+                    <a:pos x="T0" y="T1"/>
+                  </a:cxn>
+                  <a:cxn ang="0">
+                    <a:pos x="T2" y="T3"/>
+                  </a:cxn>
+                  <a:cxn ang="0">
+                    <a:pos x="T4" y="T5"/>
+                  </a:cxn>
+                  <a:cxn ang="0">
+                    <a:pos x="T6" y="T7"/>
+                  </a:cxn>
+                  <a:cxn ang="0">
+                    <a:pos x="T8" y="T9"/>
+                  </a:cxn>
+                  <a:cxn ang="0">
+                    <a:pos x="T10" y="T11"/>
+                  </a:cxn>
+                  <a:cxn ang="0">
+                    <a:pos x="T12" y="T13"/>
+                  </a:cxn>
+                </a:cxnLst>
+                <a:rect l="0" t="0" r="r" b="b"/>
+                <a:pathLst>
+                  <a:path w="1171" h="1352">
+                    <a:moveTo>
+                      <a:pt x="0" y="1014"/>
+                    </a:moveTo>
+                    <a:lnTo>
+                      <a:pt x="0" y="338"/>
+                    </a:lnTo>
+                    <a:lnTo>
+                      <a:pt x="586" y="0"/>
+                    </a:lnTo>
+                    <a:lnTo>
+                      <a:pt x="1171" y="338"/>
+                    </a:lnTo>
+                    <a:lnTo>
+                      <a:pt x="1171" y="1014"/>
+                    </a:lnTo>
+                    <a:lnTo>
+                      <a:pt x="586" y="1352"/>
+                    </a:lnTo>
+                    <a:lnTo>
+                      <a:pt x="0" y="1014"/>
+                    </a:lnTo>
+                    <a:close/>
+                  </a:path>
+                </a:pathLst>
+              </a:custGeom>
+              <a:solidFill>
+                <a:srgbClr val="2B3E54"/>
+              </a:solidFill>
+              <a:ln>
+                <a:noFill/>
+              </a:ln>
+            </p:spPr>
+            <p:txBody>
+              <a:bodyPr vert="horz" wrap="square" lIns="91440" tIns="45720" rIns="91440" bIns="45720" numCol="1" anchor="t" anchorCtr="0" compatLnSpc="1">
+                <a:prstTxWarp prst="textNoShape">
+                  <a:avLst/>
+                </a:prstTxWarp>
+              </a:bodyPr>
+              <a:lstStyle/>
+              <a:p>
+                <a:endParaRPr lang="zh-CN" altLang="en-US" sz="2133" dirty="0">
+                  <a:cs typeface="+mn-ea"/>
+                  <a:sym typeface="+mn-lt"/>
+                </a:endParaRPr>
+              </a:p>
+            </p:txBody>
+          </p:sp>
+          <p:pic>
+            <p:nvPicPr>
+              <p:cNvPr id="3" name="Graphic 2" descr="Quadcopter outline">
+                <a:extLst>
+                  <a:ext uri="{FF2B5EF4-FFF2-40B4-BE49-F238E27FC236}">
+                    <a16:creationId xmlns:a16="http://schemas.microsoft.com/office/drawing/2014/main" id="{B3052E51-F0F4-57A7-3C1D-02A7BA6005D4}"/>
+                  </a:ext>
+                </a:extLst>
+              </p:cNvPr>
+              <p:cNvPicPr>
+                <a:picLocks noChangeAspect="1"/>
+              </p:cNvPicPr>
+              <p:nvPr/>
+            </p:nvPicPr>
+            <p:blipFill>
+              <a:blip r:embed="rId3">
+                <a:extLst>
+                  <a:ext uri="{28A0092B-C50C-407E-A947-70E740481C1C}">
+                    <a14:useLocalDpi xmlns:a14="http://schemas.microsoft.com/office/drawing/2010/main" val="0"/>
+                  </a:ext>
+                  <a:ext uri="{96DAC541-7B7A-43D3-8B79-37D633B846F1}">
+                    <asvg:svgBlip xmlns:asvg="http://schemas.microsoft.com/office/drawing/2016/SVG/main" r:embed="rId4"/>
+                  </a:ext>
+                </a:extLst>
+              </a:blip>
+              <a:stretch>
+                <a:fillRect/>
+              </a:stretch>
+            </p:blipFill>
+            <p:spPr>
+              <a:xfrm>
+                <a:off x="387262" y="445591"/>
+                <a:ext cx="487234" cy="487234"/>
+              </a:xfrm>
+              <a:prstGeom prst="rect">
+                <a:avLst/>
+              </a:prstGeom>
+            </p:spPr>
+          </p:pic>
+        </p:grpSp>
+      </p:grpSp>
+      <p:grpSp>
+        <p:nvGrpSpPr>
+          <p:cNvPr id="19" name="Group 18">
+            <a:extLst>
+              <a:ext uri="{FF2B5EF4-FFF2-40B4-BE49-F238E27FC236}">
+                <a16:creationId xmlns:a16="http://schemas.microsoft.com/office/drawing/2014/main" id="{9E222194-7F7C-0AFE-E9BA-3F3252A3E095}"/>
+              </a:ext>
+            </a:extLst>
+          </p:cNvPr>
+          <p:cNvGrpSpPr/>
+          <p:nvPr/>
+        </p:nvGrpSpPr>
+        <p:grpSpPr>
+          <a:xfrm>
+            <a:off x="1050010" y="2454665"/>
+            <a:ext cx="10091981" cy="1948670"/>
+            <a:chOff x="9599261" y="340126"/>
+            <a:chExt cx="2667035" cy="1403230"/>
+          </a:xfrm>
+        </p:grpSpPr>
+        <p:sp>
+          <p:nvSpPr>
+            <p:cNvPr id="20" name="矩形 31">
+              <a:extLst>
+                <a:ext uri="{FF2B5EF4-FFF2-40B4-BE49-F238E27FC236}">
+                  <a16:creationId xmlns:a16="http://schemas.microsoft.com/office/drawing/2014/main" id="{406F04FD-420C-F628-4FDF-380406F79B3A}"/>
+                </a:ext>
+              </a:extLst>
+            </p:cNvPr>
+            <p:cNvSpPr/>
+            <p:nvPr/>
+          </p:nvSpPr>
+          <p:spPr>
+            <a:xfrm>
+              <a:off x="9599261" y="520696"/>
+              <a:ext cx="2667035" cy="1222660"/>
+            </a:xfrm>
+            <a:prstGeom prst="rect">
+              <a:avLst/>
+            </a:prstGeom>
+            <a:noFill/>
+            <a:ln w="19050">
+              <a:solidFill>
+                <a:schemeClr val="tx1">
+                  <a:lumMod val="50000"/>
+                  <a:lumOff val="50000"/>
+                </a:schemeClr>
+              </a:solidFill>
+            </a:ln>
+          </p:spPr>
+          <p:style>
+            <a:lnRef idx="2">
+              <a:schemeClr val="accent1">
+                <a:shade val="50000"/>
+              </a:schemeClr>
+            </a:lnRef>
+            <a:fillRef idx="1">
+              <a:schemeClr val="accent1"/>
+            </a:fillRef>
+            <a:effectRef idx="0">
+              <a:schemeClr val="accent1"/>
+            </a:effectRef>
+            <a:fontRef idx="minor">
+              <a:schemeClr val="lt1"/>
+            </a:fontRef>
+          </p:style>
+          <p:txBody>
+            <a:bodyPr rtlCol="0" anchor="ctr"/>
+            <a:lstStyle/>
+            <a:p>
+              <a:pPr algn="ctr"/>
+              <a:endParaRPr lang="zh-CN" altLang="en-US" sz="2400"/>
+            </a:p>
+          </p:txBody>
+        </p:sp>
+        <p:sp>
+          <p:nvSpPr>
+            <p:cNvPr id="21" name="矩形 32">
+              <a:extLst>
+                <a:ext uri="{FF2B5EF4-FFF2-40B4-BE49-F238E27FC236}">
+                  <a16:creationId xmlns:a16="http://schemas.microsoft.com/office/drawing/2014/main" id="{8203574B-3566-998D-62AA-92F776E7329A}"/>
+                </a:ext>
+              </a:extLst>
+            </p:cNvPr>
+            <p:cNvSpPr/>
+            <p:nvPr/>
+          </p:nvSpPr>
+          <p:spPr>
+            <a:xfrm>
+              <a:off x="9698251" y="909620"/>
+              <a:ext cx="2464069" cy="629056"/>
+            </a:xfrm>
+            <a:prstGeom prst="rect">
+              <a:avLst/>
+            </a:prstGeom>
+          </p:spPr>
+          <p:txBody>
+            <a:bodyPr wrap="square">
+              <a:spAutoFit/>
+            </a:bodyPr>
+            <a:lstStyle/>
+            <a:p>
+              <a:pPr marL="0" algn="l" rtl="0" eaLnBrk="1" fontAlgn="base" latinLnBrk="0" hangingPunct="1">
+                <a:lnSpc>
+                  <a:spcPct val="150000"/>
+                </a:lnSpc>
+                <a:spcBef>
+                  <a:spcPts val="0"/>
+                </a:spcBef>
+                <a:spcAft>
+                  <a:spcPts val="0"/>
+                </a:spcAft>
+              </a:pPr>
+              <a:r>
+                <a:rPr lang="en-US" kern="1200" dirty="0">
+                  <a:solidFill>
+                    <a:srgbClr val="595959"/>
+                  </a:solidFill>
+                  <a:effectLst/>
+                  <a:latin typeface="Times New Roman" panose="02020603050405020304" pitchFamily="18" charset="0"/>
+                  <a:ea typeface="等线" panose="02010600030101010101" pitchFamily="2" charset="-122"/>
+                  <a:cs typeface="Times New Roman" panose="02020603050405020304" pitchFamily="18" charset="0"/>
+                </a:rPr>
+                <a:t>The purpose of research study is to enhance the mobility of </a:t>
+              </a:r>
+              <a:r>
+                <a:rPr lang="en-US" kern="1200" dirty="0" err="1">
+                  <a:solidFill>
+                    <a:srgbClr val="595959"/>
+                  </a:solidFill>
+                  <a:effectLst/>
+                  <a:latin typeface="Times New Roman" panose="02020603050405020304" pitchFamily="18" charset="0"/>
+                  <a:ea typeface="等线" panose="02010600030101010101" pitchFamily="2" charset="-122"/>
+                  <a:cs typeface="Times New Roman" panose="02020603050405020304" pitchFamily="18" charset="0"/>
+                </a:rPr>
+                <a:t>multi-agent</a:t>
+              </a:r>
+              <a:r>
+                <a:rPr lang="en-US" kern="1200" dirty="0">
+                  <a:solidFill>
+                    <a:srgbClr val="595959"/>
+                  </a:solidFill>
+                  <a:effectLst/>
+                  <a:latin typeface="Times New Roman" panose="02020603050405020304" pitchFamily="18" charset="0"/>
+                  <a:ea typeface="等线" panose="02010600030101010101" pitchFamily="2" charset="-122"/>
+                  <a:cs typeface="Times New Roman" panose="02020603050405020304" pitchFamily="18" charset="0"/>
+                </a:rPr>
+                <a:t> systems by </a:t>
+              </a:r>
+              <a:r>
+                <a:rPr lang="en-US" dirty="0">
+                  <a:solidFill>
+                    <a:srgbClr val="595959"/>
+                  </a:solidFill>
+                  <a:latin typeface="Times New Roman" panose="02020603050405020304" pitchFamily="18" charset="0"/>
+                  <a:ea typeface="等线" panose="02010600030101010101" pitchFamily="2" charset="-122"/>
+                  <a:cs typeface="Times New Roman" panose="02020603050405020304" pitchFamily="18" charset="0"/>
+                </a:rPr>
+                <a:t>adopting a flexible formation control model that adapts to complex and changing environments. </a:t>
+              </a:r>
+              <a:endParaRPr lang="en-US" kern="1200" dirty="0">
+                <a:solidFill>
+                  <a:srgbClr val="595959"/>
+                </a:solidFill>
+                <a:effectLst/>
+                <a:latin typeface="Times New Roman" panose="02020603050405020304" pitchFamily="18" charset="0"/>
+                <a:ea typeface="等线" panose="02010600030101010101" pitchFamily="2" charset="-122"/>
+                <a:cs typeface="Times New Roman" panose="02020603050405020304" pitchFamily="18" charset="0"/>
+              </a:endParaRPr>
+            </a:p>
+          </p:txBody>
+        </p:sp>
+        <p:sp>
+          <p:nvSpPr>
+            <p:cNvPr id="23" name="矩形: 圆角 1">
+              <a:extLst>
+                <a:ext uri="{FF2B5EF4-FFF2-40B4-BE49-F238E27FC236}">
+                  <a16:creationId xmlns:a16="http://schemas.microsoft.com/office/drawing/2014/main" id="{01DAC063-87E0-5F45-81EF-49467E2934D1}"/>
+                </a:ext>
+              </a:extLst>
+            </p:cNvPr>
+            <p:cNvSpPr/>
+            <p:nvPr/>
+          </p:nvSpPr>
+          <p:spPr>
+            <a:xfrm>
+              <a:off x="9813090" y="340126"/>
+              <a:ext cx="2239372" cy="352179"/>
+            </a:xfrm>
+            <a:prstGeom prst="roundRect">
+              <a:avLst/>
+            </a:prstGeom>
+            <a:solidFill>
+              <a:srgbClr val="2B3E54"/>
+            </a:solidFill>
+            <a:ln>
+              <a:noFill/>
+            </a:ln>
+          </p:spPr>
+          <p:style>
+            <a:lnRef idx="2">
+              <a:schemeClr val="accent1">
+                <a:shade val="50000"/>
+              </a:schemeClr>
+            </a:lnRef>
+            <a:fillRef idx="1">
+              <a:schemeClr val="accent1"/>
+            </a:fillRef>
+            <a:effectRef idx="0">
+              <a:schemeClr val="accent1"/>
+            </a:effectRef>
+            <a:fontRef idx="minor">
+              <a:schemeClr val="lt1"/>
+            </a:fontRef>
+          </p:style>
+          <p:txBody>
+            <a:bodyPr rtlCol="0" anchor="ctr"/>
+            <a:lstStyle/>
+            <a:p>
+              <a:pPr algn="ctr"/>
+              <a:r>
+                <a:rPr lang="en-US" altLang="zh-CN" dirty="0">
+                  <a:solidFill>
+                    <a:schemeClr val="bg1"/>
+                  </a:solidFill>
+                  <a:latin typeface="Times New Roman" panose="02020603050405020304" pitchFamily="18" charset="0"/>
+                  <a:ea typeface="微软雅黑" pitchFamily="34" charset="-122"/>
+                  <a:cs typeface="Times New Roman" panose="02020603050405020304" pitchFamily="18" charset="0"/>
+                </a:rPr>
+                <a:t>Purpose Statement</a:t>
+              </a:r>
+              <a:endParaRPr lang="en-US" altLang="zh-CN" sz="1800" dirty="0">
+                <a:solidFill>
+                  <a:schemeClr val="bg1"/>
+                </a:solidFill>
+                <a:latin typeface="Times New Roman" panose="02020603050405020304" pitchFamily="18" charset="0"/>
+                <a:ea typeface="微软雅黑" pitchFamily="34" charset="-122"/>
+                <a:cs typeface="Times New Roman" panose="02020603050405020304" pitchFamily="18" charset="0"/>
+              </a:endParaRPr>
+            </a:p>
+          </p:txBody>
+        </p:sp>
+      </p:grpSp>
+    </p:spTree>
+    <p:extLst>
+      <p:ext uri="{BB962C8B-B14F-4D97-AF65-F5344CB8AC3E}">
+        <p14:creationId xmlns:p14="http://schemas.microsoft.com/office/powerpoint/2010/main" val="1560879041"/>
+      </p:ext>
+    </p:extLst>
+  </p:cSld>
+  <p:clrMapOvr>
+    <a:masterClrMapping/>
+  </p:clrMapOvr>
+  <p:transition spd="slow" advTm="917">
+    <p:wipe/>
+  </p:transition>
+</p:sld>
+</file>
+
+<file path=ppt/slides/slide4.xml><?xml version="1.0" encoding="utf-8"?>
+<p:sld xmlns:a="http://schemas.openxmlformats.org/drawingml/2006/main" xmlns:r="http://schemas.openxmlformats.org/officeDocument/2006/relationships" xmlns:p="http://schemas.openxmlformats.org/presentationml/2006/main">
+  <p:cSld>
+    <p:spTree>
+      <p:nvGrpSpPr>
+        <p:cNvPr id="1" name=""/>
+        <p:cNvGrpSpPr/>
+        <p:nvPr/>
+      </p:nvGrpSpPr>
+      <p:grpSpPr>
+        <a:xfrm>
+          <a:off x="0" y="0"/>
+          <a:ext cx="0" cy="0"/>
+          <a:chOff x="0" y="0"/>
+          <a:chExt cx="0" cy="0"/>
+        </a:xfrm>
+      </p:grpSpPr>
+      <p:grpSp>
+        <p:nvGrpSpPr>
+          <p:cNvPr id="5" name="Group 4">
+            <a:extLst>
+              <a:ext uri="{FF2B5EF4-FFF2-40B4-BE49-F238E27FC236}">
+                <a16:creationId xmlns:a16="http://schemas.microsoft.com/office/drawing/2014/main" id="{1B43DC62-75E0-4620-C18C-E56A947D4839}"/>
+              </a:ext>
+            </a:extLst>
+          </p:cNvPr>
+          <p:cNvGrpSpPr/>
+          <p:nvPr/>
+        </p:nvGrpSpPr>
+        <p:grpSpPr>
+          <a:xfrm>
+            <a:off x="387262" y="391902"/>
+            <a:ext cx="6972326" cy="562546"/>
+            <a:chOff x="387262" y="391902"/>
+            <a:chExt cx="6972326" cy="562546"/>
+          </a:xfrm>
+        </p:grpSpPr>
+        <p:sp>
+          <p:nvSpPr>
+            <p:cNvPr id="61" name="文本框 8">
+              <a:extLst>
+                <a:ext uri="{FF2B5EF4-FFF2-40B4-BE49-F238E27FC236}">
+                  <a16:creationId xmlns:a16="http://schemas.microsoft.com/office/drawing/2014/main" id="{0362A878-E015-4DBB-A8A6-397CF306BE02}"/>
+                </a:ext>
+              </a:extLst>
+            </p:cNvPr>
+            <p:cNvSpPr txBox="1"/>
+            <p:nvPr/>
+          </p:nvSpPr>
+          <p:spPr>
+            <a:xfrm>
+              <a:off x="979906" y="471160"/>
+              <a:ext cx="6379682" cy="461665"/>
+            </a:xfrm>
+            <a:prstGeom prst="rect">
+              <a:avLst/>
+            </a:prstGeom>
+            <a:noFill/>
+          </p:spPr>
+          <p:txBody>
+            <a:bodyPr wrap="square" lIns="91440" tIns="45720" rIns="91440" bIns="45720" rtlCol="0">
+              <a:spAutoFit/>
+            </a:bodyPr>
+            <a:lstStyle>
+              <a:defPPr>
+                <a:defRPr lang="zh-CN"/>
+              </a:defPPr>
+              <a:lvl1pPr marL="0" algn="l" defTabSz="914400" rtl="0" eaLnBrk="1" latinLnBrk="0" hangingPunct="1">
+                <a:defRPr sz="1800" kern="1200">
+                  <a:solidFill>
+                    <a:schemeClr val="tx1"/>
+                  </a:solidFill>
+                  <a:latin typeface="+mn-lt"/>
+                  <a:ea typeface="+mn-ea"/>
+                  <a:cs typeface="+mn-cs"/>
+                </a:defRPr>
+              </a:lvl1pPr>
+              <a:lvl2pPr marL="457200" algn="l" defTabSz="914400" rtl="0" eaLnBrk="1" latinLnBrk="0" hangingPunct="1">
+                <a:defRPr sz="1800" kern="1200">
+                  <a:solidFill>
+                    <a:schemeClr val="tx1"/>
+                  </a:solidFill>
+                  <a:latin typeface="+mn-lt"/>
+                  <a:ea typeface="+mn-ea"/>
+                  <a:cs typeface="+mn-cs"/>
+                </a:defRPr>
+              </a:lvl2pPr>
+              <a:lvl3pPr marL="914400" algn="l" defTabSz="914400" rtl="0" eaLnBrk="1" latinLnBrk="0" hangingPunct="1">
+                <a:defRPr sz="1800" kern="1200">
+                  <a:solidFill>
+                    <a:schemeClr val="tx1"/>
+                  </a:solidFill>
+                  <a:latin typeface="+mn-lt"/>
+                  <a:ea typeface="+mn-ea"/>
+                  <a:cs typeface="+mn-cs"/>
+                </a:defRPr>
+              </a:lvl3pPr>
+              <a:lvl4pPr marL="1371600" algn="l" defTabSz="914400" rtl="0" eaLnBrk="1" latinLnBrk="0" hangingPunct="1">
+                <a:defRPr sz="1800" kern="1200">
+                  <a:solidFill>
+                    <a:schemeClr val="tx1"/>
+                  </a:solidFill>
+                  <a:latin typeface="+mn-lt"/>
+                  <a:ea typeface="+mn-ea"/>
+                  <a:cs typeface="+mn-cs"/>
+                </a:defRPr>
+              </a:lvl4pPr>
+              <a:lvl5pPr marL="1828800" algn="l" defTabSz="914400" rtl="0" eaLnBrk="1" latinLnBrk="0" hangingPunct="1">
+                <a:defRPr sz="1800" kern="1200">
+                  <a:solidFill>
+                    <a:schemeClr val="tx1"/>
+                  </a:solidFill>
+                  <a:latin typeface="+mn-lt"/>
+                  <a:ea typeface="+mn-ea"/>
+                  <a:cs typeface="+mn-cs"/>
+                </a:defRPr>
+              </a:lvl5pPr>
+              <a:lvl6pPr marL="2286000" algn="l" defTabSz="914400" rtl="0" eaLnBrk="1" latinLnBrk="0" hangingPunct="1">
+                <a:defRPr sz="1800" kern="1200">
+                  <a:solidFill>
+                    <a:schemeClr val="tx1"/>
+                  </a:solidFill>
+                  <a:latin typeface="+mn-lt"/>
+                  <a:ea typeface="+mn-ea"/>
+                  <a:cs typeface="+mn-cs"/>
+                </a:defRPr>
+              </a:lvl6pPr>
+              <a:lvl7pPr marL="2743200" algn="l" defTabSz="914400" rtl="0" eaLnBrk="1" latinLnBrk="0" hangingPunct="1">
+                <a:defRPr sz="1800" kern="1200">
+                  <a:solidFill>
+                    <a:schemeClr val="tx1"/>
+                  </a:solidFill>
+                  <a:latin typeface="+mn-lt"/>
+                  <a:ea typeface="+mn-ea"/>
+                  <a:cs typeface="+mn-cs"/>
+                </a:defRPr>
+              </a:lvl7pPr>
+              <a:lvl8pPr marL="3200400" algn="l" defTabSz="914400" rtl="0" eaLnBrk="1" latinLnBrk="0" hangingPunct="1">
+                <a:defRPr sz="1800" kern="1200">
+                  <a:solidFill>
+                    <a:schemeClr val="tx1"/>
+                  </a:solidFill>
+                  <a:latin typeface="+mn-lt"/>
+                  <a:ea typeface="+mn-ea"/>
+                  <a:cs typeface="+mn-cs"/>
+                </a:defRPr>
+              </a:lvl8pPr>
+              <a:lvl9pPr marL="3657600" algn="l" defTabSz="914400" rtl="0" eaLnBrk="1" latinLnBrk="0" hangingPunct="1">
+                <a:defRPr sz="1800" kern="1200">
+                  <a:solidFill>
+                    <a:schemeClr val="tx1"/>
+                  </a:solidFill>
+                  <a:latin typeface="+mn-lt"/>
+                  <a:ea typeface="+mn-ea"/>
+                  <a:cs typeface="+mn-cs"/>
+                </a:defRPr>
+              </a:lvl9pPr>
+            </a:lstStyle>
+            <a:p>
+              <a:r>
+                <a:rPr lang="en-US" altLang="zh-CN" sz="2400" dirty="0">
+                  <a:solidFill>
+                    <a:srgbClr val="2B3E54"/>
+                  </a:solidFill>
+                  <a:latin typeface="Times New Roman" panose="02020603050405020304" pitchFamily="18" charset="0"/>
+                  <a:cs typeface="Times New Roman" panose="02020603050405020304" pitchFamily="18" charset="0"/>
+                  <a:sym typeface="+mn-lt"/>
+                </a:rPr>
                 <a:t>Simulation (Tentative)</a:t>
               </a:r>
             </a:p>
@@ -13361,8 +14055,8 @@
           </p:spPr>
         </p:pic>
       </p:grpSp>
-      <mc:AlternateContent xmlns:mc="http://schemas.openxmlformats.org/markup-compatibility/2006">
-        <mc:Choice xmlns:a14="http://schemas.microsoft.com/office/drawing/2010/main" Requires="a14">
+      <mc:AlternateContent xmlns:mc="http://schemas.openxmlformats.org/markup-compatibility/2006" xmlns:a14="http://schemas.microsoft.com/office/drawing/2010/main">
+        <mc:Choice Requires="a14">
           <p:sp>
             <p:nvSpPr>
               <p:cNvPr id="55" name="TextBox 54">
@@ -13797,7 +14491,7 @@
             </p:txBody>
           </p:sp>
         </mc:Choice>
-        <mc:Fallback>
+        <mc:Fallback xmlns="">
           <p:sp>
             <p:nvSpPr>
               <p:cNvPr id="55" name="TextBox 54">
@@ -14147,7 +14841,7 @@
 </p:sld>
 </file>
 
-<file path=ppt/slides/slide4.xml><?xml version="1.0" encoding="utf-8"?>
+<file path=ppt/slides/slide5.xml><?xml version="1.0" encoding="utf-8"?>
 <p:sld xmlns:a="http://schemas.openxmlformats.org/drawingml/2006/main" xmlns:r="http://schemas.openxmlformats.org/officeDocument/2006/relationships" xmlns:p="http://schemas.openxmlformats.org/presentationml/2006/main">
   <p:cSld>
     <p:spTree>
@@ -15106,8 +15800,8 @@
           </a:prstGeom>
         </p:spPr>
       </p:pic>
-      <mc:AlternateContent xmlns:mc="http://schemas.openxmlformats.org/markup-compatibility/2006">
-        <mc:Choice xmlns:a14="http://schemas.microsoft.com/office/drawing/2010/main" Requires="a14">
+      <mc:AlternateContent xmlns:mc="http://schemas.openxmlformats.org/markup-compatibility/2006" xmlns:a14="http://schemas.microsoft.com/office/drawing/2010/main">
+        <mc:Choice Requires="a14">
           <p:sp>
             <p:nvSpPr>
               <p:cNvPr id="55" name="TextBox 54">
@@ -15542,7 +16236,7 @@
             </p:txBody>
           </p:sp>
         </mc:Choice>
-        <mc:Fallback>
+        <mc:Fallback xmlns="">
           <p:sp>
             <p:nvSpPr>
               <p:cNvPr id="55" name="TextBox 54">

</xml_diff>